<commit_message>
Minor fix to control flow case statement slideshow (C# -> C in terminal)
</commit_message>
<xml_diff>
--- a/resources/ppt-slides/control-flow-case-statement.pptx
+++ b/resources/ppt-slides/control-flow-case-statement.pptx
@@ -5419,7 +5419,7 @@
             <a:p>
               <a:r>
                 <a:rPr lang="en-US" dirty="0"/>
-                <a:t>C#</a:t>
+                <a:t>C</a:t>
               </a:r>
             </a:p>
           </p:txBody>
@@ -7310,7 +7310,9 @@
               </a:prstGeom>
               <a:ln w="25400">
                 <a:solidFill>
-                  <a:schemeClr val="tx1"/>
+                  <a:schemeClr val="bg1">
+                    <a:lumMod val="65000"/>
+                  </a:schemeClr>
                 </a:solidFill>
               </a:ln>
             </p:spPr>
@@ -8315,7 +8317,13 @@
             <a:lstStyle/>
             <a:p>
               <a:r>
-                <a:rPr lang="en-US" dirty="0"/>
+                <a:rPr lang="en-US" dirty="0">
+                  <a:solidFill>
+                    <a:schemeClr val="bg1">
+                      <a:lumMod val="65000"/>
+                    </a:schemeClr>
+                  </a:solidFill>
+                </a:rPr>
                 <a:t>Fortran</a:t>
               </a:r>
             </a:p>
@@ -13596,7 +13604,7 @@
                   </a:schemeClr>
                 </a:solidFill>
               </a:rPr>
-              <a:t>C#</a:t>
+              <a:t>C</a:t>
             </a:r>
           </a:p>
         </p:txBody>
@@ -16154,7 +16162,7 @@
                   </a:schemeClr>
                 </a:solidFill>
               </a:rPr>
-              <a:t>C#</a:t>
+              <a:t>C</a:t>
             </a:r>
           </a:p>
         </p:txBody>
@@ -18759,7 +18767,7 @@
                   </a:schemeClr>
                 </a:solidFill>
               </a:rPr>
-              <a:t>C#</a:t>
+              <a:t>C</a:t>
             </a:r>
           </a:p>
         </p:txBody>
@@ -21350,7 +21358,7 @@
                   </a:schemeClr>
                 </a:solidFill>
               </a:rPr>
-              <a:t>C#</a:t>
+              <a:t>C</a:t>
             </a:r>
           </a:p>
         </p:txBody>
@@ -23892,7 +23900,7 @@
                   </a:schemeClr>
                 </a:solidFill>
               </a:rPr>
-              <a:t>C#</a:t>
+              <a:t>C</a:t>
             </a:r>
           </a:p>
         </p:txBody>
@@ -26328,10 +26336,9 @@
           <a:lstStyle/>
           <a:p>
             <a:r>
-              <a:rPr lang="en-US"/>
+              <a:rPr lang="en-US" dirty="0"/>
               <a:t>16,17</a:t>
             </a:r>
-            <a:endParaRPr lang="en-US" dirty="0"/>
           </a:p>
         </p:txBody>
       </p:sp>
@@ -26479,7 +26486,7 @@
                   </a:schemeClr>
                 </a:solidFill>
               </a:rPr>
-              <a:t>C#</a:t>
+              <a:t>C</a:t>
             </a:r>
           </a:p>
         </p:txBody>
@@ -29020,7 +29027,7 @@
                   </a:schemeClr>
                 </a:solidFill>
               </a:rPr>
-              <a:t>C#</a:t>
+              <a:t>C</a:t>
             </a:r>
           </a:p>
         </p:txBody>

</xml_diff>

<commit_message>
update case and slides
</commit_message>
<xml_diff>
--- a/resources/ppt-slides/control-flow-case-statement.pptx
+++ b/resources/ppt-slides/control-flow-case-statement.pptx
@@ -10477,7 +10477,7 @@
         </p:nvSpPr>
         <p:spPr>
           <a:xfrm>
-            <a:off x="241105" y="3360215"/>
+            <a:off x="241105" y="3375845"/>
             <a:ext cx="3005859" cy="1461786"/>
           </a:xfrm>
           <a:custGeom>
@@ -11103,7 +11103,7 @@
                   </a:schemeClr>
                 </a:solidFill>
               </a:rPr>
-              <a:t>These are great low level languages …</a:t>
+              <a:t>These are great low level languages…</a:t>
             </a:r>
             <a:endParaRPr lang="en-US" dirty="0">
               <a:solidFill>
@@ -11280,7 +11280,7 @@
         <p:spPr>
           <a:xfrm>
             <a:off x="2273467" y="583701"/>
-            <a:ext cx="5046276" cy="2554545"/>
+            <a:ext cx="5046276" cy="2308324"/>
           </a:xfrm>
           <a:prstGeom prst="rect">
             <a:avLst/>
@@ -11411,7 +11411,7 @@
                   </a:schemeClr>
                 </a:solidFill>
               </a:rPr>
-              <a:t>    WriteLine("These are great low level languages - we will be using these soon!");</a:t>
+              <a:t>    WriteLine("These are great low level languages…");</a:t>
             </a:r>
           </a:p>
           <a:p>
@@ -13455,7 +13455,7 @@
           <a:p>
             <a:r>
               <a:rPr lang="en-US" dirty="0"/>
-              <a:t>6,7</a:t>
+              <a:t>7</a:t>
             </a:r>
           </a:p>
         </p:txBody>
@@ -13824,7 +13824,7 @@
         <p:spPr>
           <a:xfrm>
             <a:off x="2273467" y="583701"/>
-            <a:ext cx="5046276" cy="2554545"/>
+            <a:ext cx="5046276" cy="2308324"/>
           </a:xfrm>
           <a:prstGeom prst="rect">
             <a:avLst/>
@@ -13969,7 +13969,7 @@
                   </a:schemeClr>
                 </a:solidFill>
               </a:rPr>
-              <a:t>    WriteLine("These are great low level languages - we will be using these soon!");</a:t>
+              <a:t>    WriteLine("These are great low level languages…");</a:t>
             </a:r>
           </a:p>
           <a:p>
@@ -16429,7 +16429,7 @@
         <p:spPr>
           <a:xfrm>
             <a:off x="2273467" y="583701"/>
-            <a:ext cx="5046276" cy="2554545"/>
+            <a:ext cx="5046276" cy="2308324"/>
           </a:xfrm>
           <a:prstGeom prst="rect">
             <a:avLst/>
@@ -16574,7 +16574,7 @@
                   </a:schemeClr>
                 </a:solidFill>
               </a:rPr>
-              <a:t>    WriteLine("These are great low level languages - we will be using these soon!");</a:t>
+              <a:t>    WriteLine("These are great low level languages…");</a:t>
             </a:r>
           </a:p>
           <a:p>
@@ -19034,7 +19034,7 @@
         <p:spPr>
           <a:xfrm>
             <a:off x="2273467" y="583701"/>
-            <a:ext cx="5046276" cy="2554545"/>
+            <a:ext cx="5046276" cy="2308324"/>
           </a:xfrm>
           <a:prstGeom prst="rect">
             <a:avLst/>
@@ -19085,7 +19085,7 @@
                   </a:schemeClr>
                 </a:solidFill>
               </a:rPr>
-              <a:t>    WriteLine("These are great low level languages - we will be using these soon!");</a:t>
+              <a:t>    WriteLine("These are great low level languages…");</a:t>
             </a:r>
           </a:p>
           <a:p>
@@ -21578,7 +21578,7 @@
         <p:spPr>
           <a:xfrm>
             <a:off x="2273467" y="583701"/>
-            <a:ext cx="5046276" cy="2554545"/>
+            <a:ext cx="5046276" cy="2308324"/>
           </a:xfrm>
           <a:prstGeom prst="rect">
             <a:avLst/>
@@ -21629,7 +21629,7 @@
             </a:pPr>
             <a:r>
               <a:rPr lang="en-AU" sz="1600" dirty="0"/>
-              <a:t>    WriteLine("These are great low level languages - we will be using these soon!");</a:t>
+              <a:t>    WriteLine("These are great low level languages…");</a:t>
             </a:r>
           </a:p>
           <a:p>
@@ -22936,7 +22936,7 @@
           </p:nvCxnSpPr>
           <p:spPr>
             <a:xfrm flipV="1">
-              <a:off x="5227292" y="5910230"/>
+              <a:off x="5227292" y="5518016"/>
               <a:ext cx="0" cy="190856"/>
             </a:xfrm>
             <a:prstGeom prst="line">
@@ -24076,7 +24076,7 @@
         <p:spPr>
           <a:xfrm>
             <a:off x="3355252" y="3853130"/>
-            <a:ext cx="3823816" cy="646331"/>
+            <a:ext cx="3823816" cy="369332"/>
           </a:xfrm>
           <a:prstGeom prst="rect">
             <a:avLst/>
@@ -24091,7 +24091,7 @@
           <a:p>
             <a:r>
               <a:rPr lang="en-AU" sz="1800" dirty="0"/>
-              <a:t>These are great low level languages - we will be using these soon!</a:t>
+              <a:t>These are great low level languages…</a:t>
             </a:r>
             <a:endParaRPr lang="en-US" dirty="0">
               <a:solidFill>
@@ -24162,7 +24162,7 @@
         <p:spPr>
           <a:xfrm>
             <a:off x="2273467" y="583701"/>
-            <a:ext cx="5046276" cy="2554545"/>
+            <a:ext cx="5046276" cy="2308324"/>
           </a:xfrm>
           <a:prstGeom prst="rect">
             <a:avLst/>
@@ -24219,7 +24219,7 @@
                   </a:schemeClr>
                 </a:solidFill>
               </a:rPr>
-              <a:t>    WriteLine("These are great low level languages - we will be using these soon!");</a:t>
+              <a:t>    WriteLine("These are great low level languages…");</a:t>
             </a:r>
           </a:p>
           <a:p>
@@ -25520,7 +25520,7 @@
           </p:nvCxnSpPr>
           <p:spPr>
             <a:xfrm flipV="1">
-              <a:off x="5227292" y="5910230"/>
+              <a:off x="5227292" y="5537145"/>
               <a:ext cx="0" cy="190856"/>
             </a:xfrm>
             <a:prstGeom prst="line">
@@ -26337,7 +26337,7 @@
           <a:p>
             <a:r>
               <a:rPr lang="en-US" dirty="0"/>
-              <a:t>16,17</a:t>
+              <a:t>17</a:t>
             </a:r>
           </a:p>
         </p:txBody>
@@ -26542,8 +26542,8 @@
         </p:nvGrpSpPr>
         <p:grpSpPr>
           <a:xfrm>
-            <a:off x="1947650" y="1755649"/>
-            <a:ext cx="407468" cy="2097482"/>
+            <a:off x="1947650" y="1511344"/>
+            <a:ext cx="407468" cy="2341787"/>
             <a:chOff x="1668759" y="-13958058"/>
             <a:chExt cx="487848" cy="22198517"/>
           </a:xfrm>
@@ -26662,7 +26662,7 @@
         <p:spPr>
           <a:xfrm>
             <a:off x="3355252" y="3853130"/>
-            <a:ext cx="3823816" cy="646331"/>
+            <a:ext cx="3823816" cy="369332"/>
           </a:xfrm>
           <a:prstGeom prst="rect">
             <a:avLst/>
@@ -26683,7 +26683,7 @@
                   </a:schemeClr>
                 </a:solidFill>
               </a:rPr>
-              <a:t>These are great low level languages - we will be using these soon!</a:t>
+              <a:t>These are great low level languages…</a:t>
             </a:r>
             <a:endParaRPr lang="en-US" dirty="0">
               <a:solidFill>
@@ -26754,7 +26754,7 @@
         <p:spPr>
           <a:xfrm>
             <a:off x="2273467" y="583701"/>
-            <a:ext cx="5046276" cy="2554545"/>
+            <a:ext cx="5046276" cy="2308324"/>
           </a:xfrm>
           <a:prstGeom prst="rect">
             <a:avLst/>
@@ -26811,7 +26811,7 @@
                   </a:schemeClr>
                 </a:solidFill>
               </a:rPr>
-              <a:t>    WriteLine("These are great low level languages - we will be using these soon!");</a:t>
+              <a:t>    WriteLine("These are great low level languages…");</a:t>
             </a:r>
           </a:p>
           <a:p>
@@ -26820,7 +26820,13 @@
               <a:buAutoNum type="arabicPeriod" startAt="10"/>
             </a:pPr>
             <a:r>
-              <a:rPr lang="en-AU" sz="1600" dirty="0"/>
+              <a:rPr lang="en-AU" sz="1600" dirty="0">
+                <a:solidFill>
+                  <a:schemeClr val="bg1">
+                    <a:lumMod val="65000"/>
+                  </a:schemeClr>
+                </a:solidFill>
+              </a:rPr>
               <a:t>    break;</a:t>
             </a:r>
           </a:p>
@@ -29083,8 +29089,8 @@
         </p:nvGrpSpPr>
         <p:grpSpPr>
           <a:xfrm>
-            <a:off x="1947650" y="2980033"/>
-            <a:ext cx="407468" cy="611247"/>
+            <a:off x="1947650" y="2706101"/>
+            <a:ext cx="407468" cy="885179"/>
             <a:chOff x="1668759" y="-13958058"/>
             <a:chExt cx="487848" cy="22198517"/>
           </a:xfrm>
@@ -29203,7 +29209,7 @@
         <p:spPr>
           <a:xfrm>
             <a:off x="3355252" y="3853130"/>
-            <a:ext cx="3823816" cy="646331"/>
+            <a:ext cx="3823816" cy="369332"/>
           </a:xfrm>
           <a:prstGeom prst="rect">
             <a:avLst/>
@@ -29224,7 +29230,7 @@
                   </a:schemeClr>
                 </a:solidFill>
               </a:rPr>
-              <a:t>These are great low level languages - we will be using these soon!</a:t>
+              <a:t>These are great low level languages…</a:t>
             </a:r>
             <a:endParaRPr lang="en-US" dirty="0">
               <a:solidFill>
@@ -29250,7 +29256,7 @@
         </p:nvSpPr>
         <p:spPr>
           <a:xfrm>
-            <a:off x="3365371" y="4429273"/>
+            <a:off x="3365371" y="4124474"/>
             <a:ext cx="2862468" cy="369332"/>
           </a:xfrm>
           <a:prstGeom prst="rect">

</xml_diff>

<commit_message>
Progress edit P1C3 case statement concept.
</commit_message>
<xml_diff>
--- a/resources/ppt-slides/control-flow-case-statement.pptx
+++ b/resources/ppt-slides/control-flow-case-statement.pptx
@@ -253,7 +253,7 @@
           <a:p>
             <a:fld id="{964302DC-9F53-934F-AE4D-0F1F197008C1}" type="datetimeFigureOut">
               <a:rPr lang="en-US" smtClean="0"/>
-              <a:t>10/4/23</a:t>
+              <a:t>2/8/24</a:t>
             </a:fld>
             <a:endParaRPr lang="en-US"/>
           </a:p>
@@ -423,7 +423,7 @@
           <a:p>
             <a:fld id="{964302DC-9F53-934F-AE4D-0F1F197008C1}" type="datetimeFigureOut">
               <a:rPr lang="en-US" smtClean="0"/>
-              <a:t>10/4/23</a:t>
+              <a:t>2/8/24</a:t>
             </a:fld>
             <a:endParaRPr lang="en-US"/>
           </a:p>
@@ -603,7 +603,7 @@
           <a:p>
             <a:fld id="{964302DC-9F53-934F-AE4D-0F1F197008C1}" type="datetimeFigureOut">
               <a:rPr lang="en-US" smtClean="0"/>
-              <a:t>10/4/23</a:t>
+              <a:t>2/8/24</a:t>
             </a:fld>
             <a:endParaRPr lang="en-US"/>
           </a:p>
@@ -773,7 +773,7 @@
           <a:p>
             <a:fld id="{964302DC-9F53-934F-AE4D-0F1F197008C1}" type="datetimeFigureOut">
               <a:rPr lang="en-US" smtClean="0"/>
-              <a:t>10/4/23</a:t>
+              <a:t>2/8/24</a:t>
             </a:fld>
             <a:endParaRPr lang="en-US"/>
           </a:p>
@@ -1017,7 +1017,7 @@
           <a:p>
             <a:fld id="{964302DC-9F53-934F-AE4D-0F1F197008C1}" type="datetimeFigureOut">
               <a:rPr lang="en-US" smtClean="0"/>
-              <a:t>10/4/23</a:t>
+              <a:t>2/8/24</a:t>
             </a:fld>
             <a:endParaRPr lang="en-US"/>
           </a:p>
@@ -1249,7 +1249,7 @@
           <a:p>
             <a:fld id="{964302DC-9F53-934F-AE4D-0F1F197008C1}" type="datetimeFigureOut">
               <a:rPr lang="en-US" smtClean="0"/>
-              <a:t>10/4/23</a:t>
+              <a:t>2/8/24</a:t>
             </a:fld>
             <a:endParaRPr lang="en-US"/>
           </a:p>
@@ -1616,7 +1616,7 @@
           <a:p>
             <a:fld id="{964302DC-9F53-934F-AE4D-0F1F197008C1}" type="datetimeFigureOut">
               <a:rPr lang="en-US" smtClean="0"/>
-              <a:t>10/4/23</a:t>
+              <a:t>2/8/24</a:t>
             </a:fld>
             <a:endParaRPr lang="en-US"/>
           </a:p>
@@ -1734,7 +1734,7 @@
           <a:p>
             <a:fld id="{964302DC-9F53-934F-AE4D-0F1F197008C1}" type="datetimeFigureOut">
               <a:rPr lang="en-US" smtClean="0"/>
-              <a:t>10/4/23</a:t>
+              <a:t>2/8/24</a:t>
             </a:fld>
             <a:endParaRPr lang="en-US"/>
           </a:p>
@@ -1829,7 +1829,7 @@
           <a:p>
             <a:fld id="{964302DC-9F53-934F-AE4D-0F1F197008C1}" type="datetimeFigureOut">
               <a:rPr lang="en-US" smtClean="0"/>
-              <a:t>10/4/23</a:t>
+              <a:t>2/8/24</a:t>
             </a:fld>
             <a:endParaRPr lang="en-US"/>
           </a:p>
@@ -2106,7 +2106,7 @@
           <a:p>
             <a:fld id="{964302DC-9F53-934F-AE4D-0F1F197008C1}" type="datetimeFigureOut">
               <a:rPr lang="en-US" smtClean="0"/>
-              <a:t>10/4/23</a:t>
+              <a:t>2/8/24</a:t>
             </a:fld>
             <a:endParaRPr lang="en-US"/>
           </a:p>
@@ -2363,7 +2363,7 @@
           <a:p>
             <a:fld id="{964302DC-9F53-934F-AE4D-0F1F197008C1}" type="datetimeFigureOut">
               <a:rPr lang="en-US" smtClean="0"/>
-              <a:t>10/4/23</a:t>
+              <a:t>2/8/24</a:t>
             </a:fld>
             <a:endParaRPr lang="en-US"/>
           </a:p>
@@ -2428,9 +2428,18 @@
 <p:sldMaster xmlns:a="http://schemas.openxmlformats.org/drawingml/2006/main" xmlns:r="http://schemas.openxmlformats.org/officeDocument/2006/relationships" xmlns:p="http://schemas.openxmlformats.org/presentationml/2006/main">
   <p:cSld>
     <p:bg>
-      <p:bgRef idx="1001">
-        <a:schemeClr val="bg1"/>
-      </p:bgRef>
+      <p:bgPr>
+        <a:blipFill dpi="0" rotWithShape="1">
+          <a:blip r:embed="rId13">
+            <a:lum/>
+          </a:blip>
+          <a:srcRect/>
+          <a:stretch>
+            <a:fillRect/>
+          </a:stretch>
+        </a:blipFill>
+        <a:effectLst/>
+      </p:bgPr>
     </p:bg>
     <p:spTree>
       <p:nvGrpSpPr>
@@ -2576,7 +2585,7 @@
           <a:p>
             <a:fld id="{964302DC-9F53-934F-AE4D-0F1F197008C1}" type="datetimeFigureOut">
               <a:rPr lang="en-US" smtClean="0"/>
-              <a:t>10/4/23</a:t>
+              <a:t>2/8/24</a:t>
             </a:fld>
             <a:endParaRPr lang="en-US"/>
           </a:p>
@@ -2967,20 +2976,6 @@
 <file path=ppt/slides/slide1.xml><?xml version="1.0" encoding="utf-8"?>
 <p:sld xmlns:a="http://schemas.openxmlformats.org/drawingml/2006/main" xmlns:r="http://schemas.openxmlformats.org/officeDocument/2006/relationships" xmlns:p="http://schemas.openxmlformats.org/presentationml/2006/main">
   <p:cSld>
-    <p:bg>
-      <p:bgPr>
-        <a:blipFill dpi="0" rotWithShape="1">
-          <a:blip r:embed="rId2">
-            <a:lum/>
-          </a:blip>
-          <a:srcRect/>
-          <a:stretch>
-            <a:fillRect/>
-          </a:stretch>
-        </a:blipFill>
-        <a:effectLst/>
-      </p:bgPr>
-    </p:bg>
     <p:spTree>
       <p:nvGrpSpPr>
         <p:cNvPr id="1" name=""/>
@@ -3240,7 +3235,7 @@
               <p:nvPr/>
             </p:nvPicPr>
             <p:blipFill>
-              <a:blip r:embed="rId3">
+              <a:blip r:embed="rId2">
                 <a:alphaModFix amt="30000"/>
               </a:blip>
               <a:stretch>
@@ -5331,7 +5326,7 @@
             <p:nvPr/>
           </p:nvPicPr>
           <p:blipFill>
-            <a:blip r:embed="rId4">
+            <a:blip r:embed="rId3">
               <a:alphaModFix amt="30000"/>
             </a:blip>
             <a:stretch>
@@ -5420,272 +5415,6 @@
               <a:r>
                 <a:rPr lang="en-US" dirty="0"/>
                 <a:t>C</a:t>
-              </a:r>
-            </a:p>
-          </p:txBody>
-        </p:sp>
-        <p:sp>
-          <p:nvSpPr>
-            <p:cNvPr id="9" name="Rectangle 8">
-              <a:extLst>
-                <a:ext uri="{FF2B5EF4-FFF2-40B4-BE49-F238E27FC236}">
-                  <a16:creationId xmlns:a16="http://schemas.microsoft.com/office/drawing/2014/main" id="{5DC39B20-F863-7C67-FD78-60CFCC23A0E8}"/>
-                </a:ext>
-              </a:extLst>
-            </p:cNvPr>
-            <p:cNvSpPr/>
-            <p:nvPr/>
-          </p:nvSpPr>
-          <p:spPr>
-            <a:xfrm>
-              <a:off x="5034017" y="-2432404"/>
-              <a:ext cx="2127795" cy="1085065"/>
-            </a:xfrm>
-            <a:custGeom>
-              <a:avLst/>
-              <a:gdLst>
-                <a:gd name="connsiteX0" fmla="*/ 0 w 2127795"/>
-                <a:gd name="connsiteY0" fmla="*/ 0 h 1085065"/>
-                <a:gd name="connsiteX1" fmla="*/ 510671 w 2127795"/>
-                <a:gd name="connsiteY1" fmla="*/ 0 h 1085065"/>
-                <a:gd name="connsiteX2" fmla="*/ 1042620 w 2127795"/>
-                <a:gd name="connsiteY2" fmla="*/ 0 h 1085065"/>
-                <a:gd name="connsiteX3" fmla="*/ 1595846 w 2127795"/>
-                <a:gd name="connsiteY3" fmla="*/ 0 h 1085065"/>
-                <a:gd name="connsiteX4" fmla="*/ 2127795 w 2127795"/>
-                <a:gd name="connsiteY4" fmla="*/ 0 h 1085065"/>
-                <a:gd name="connsiteX5" fmla="*/ 2127795 w 2127795"/>
-                <a:gd name="connsiteY5" fmla="*/ 553383 h 1085065"/>
-                <a:gd name="connsiteX6" fmla="*/ 2127795 w 2127795"/>
-                <a:gd name="connsiteY6" fmla="*/ 1085065 h 1085065"/>
-                <a:gd name="connsiteX7" fmla="*/ 1553290 w 2127795"/>
-                <a:gd name="connsiteY7" fmla="*/ 1085065 h 1085065"/>
-                <a:gd name="connsiteX8" fmla="*/ 978786 w 2127795"/>
-                <a:gd name="connsiteY8" fmla="*/ 1085065 h 1085065"/>
-                <a:gd name="connsiteX9" fmla="*/ 0 w 2127795"/>
-                <a:gd name="connsiteY9" fmla="*/ 1085065 h 1085065"/>
-                <a:gd name="connsiteX10" fmla="*/ 0 w 2127795"/>
-                <a:gd name="connsiteY10" fmla="*/ 553383 h 1085065"/>
-                <a:gd name="connsiteX11" fmla="*/ 0 w 2127795"/>
-                <a:gd name="connsiteY11" fmla="*/ 0 h 1085065"/>
-              </a:gdLst>
-              <a:ahLst/>
-              <a:cxnLst>
-                <a:cxn ang="0">
-                  <a:pos x="connsiteX0" y="connsiteY0"/>
-                </a:cxn>
-                <a:cxn ang="0">
-                  <a:pos x="connsiteX1" y="connsiteY1"/>
-                </a:cxn>
-                <a:cxn ang="0">
-                  <a:pos x="connsiteX2" y="connsiteY2"/>
-                </a:cxn>
-                <a:cxn ang="0">
-                  <a:pos x="connsiteX3" y="connsiteY3"/>
-                </a:cxn>
-                <a:cxn ang="0">
-                  <a:pos x="connsiteX4" y="connsiteY4"/>
-                </a:cxn>
-                <a:cxn ang="0">
-                  <a:pos x="connsiteX5" y="connsiteY5"/>
-                </a:cxn>
-                <a:cxn ang="0">
-                  <a:pos x="connsiteX6" y="connsiteY6"/>
-                </a:cxn>
-                <a:cxn ang="0">
-                  <a:pos x="connsiteX7" y="connsiteY7"/>
-                </a:cxn>
-                <a:cxn ang="0">
-                  <a:pos x="connsiteX8" y="connsiteY8"/>
-                </a:cxn>
-                <a:cxn ang="0">
-                  <a:pos x="connsiteX9" y="connsiteY9"/>
-                </a:cxn>
-                <a:cxn ang="0">
-                  <a:pos x="connsiteX10" y="connsiteY10"/>
-                </a:cxn>
-                <a:cxn ang="0">
-                  <a:pos x="connsiteX11" y="connsiteY11"/>
-                </a:cxn>
-              </a:cxnLst>
-              <a:rect l="l" t="t" r="r" b="b"/>
-              <a:pathLst>
-                <a:path w="2127795" h="1085065" fill="none" extrusionOk="0">
-                  <a:moveTo>
-                    <a:pt x="0" y="0"/>
-                  </a:moveTo>
-                  <a:cubicBezTo>
-                    <a:pt x="119302" y="-23815"/>
-                    <a:pt x="321953" y="-4268"/>
-                    <a:pt x="510671" y="0"/>
-                  </a:cubicBezTo>
-                  <a:cubicBezTo>
-                    <a:pt x="699389" y="4268"/>
-                    <a:pt x="838038" y="-4296"/>
-                    <a:pt x="1042620" y="0"/>
-                  </a:cubicBezTo>
-                  <a:cubicBezTo>
-                    <a:pt x="1247202" y="4296"/>
-                    <a:pt x="1418238" y="-20161"/>
-                    <a:pt x="1595846" y="0"/>
-                  </a:cubicBezTo>
-                  <a:cubicBezTo>
-                    <a:pt x="1773454" y="20161"/>
-                    <a:pt x="1930348" y="288"/>
-                    <a:pt x="2127795" y="0"/>
-                  </a:cubicBezTo>
-                  <a:cubicBezTo>
-                    <a:pt x="2127420" y="271704"/>
-                    <a:pt x="2137858" y="397892"/>
-                    <a:pt x="2127795" y="553383"/>
-                  </a:cubicBezTo>
-                  <a:cubicBezTo>
-                    <a:pt x="2117732" y="708874"/>
-                    <a:pt x="2106280" y="956975"/>
-                    <a:pt x="2127795" y="1085065"/>
-                  </a:cubicBezTo>
-                  <a:cubicBezTo>
-                    <a:pt x="1890946" y="1101697"/>
-                    <a:pt x="1709293" y="1081968"/>
-                    <a:pt x="1553290" y="1085065"/>
-                  </a:cubicBezTo>
-                  <a:cubicBezTo>
-                    <a:pt x="1397287" y="1088162"/>
-                    <a:pt x="1242166" y="1089720"/>
-                    <a:pt x="978786" y="1085065"/>
-                  </a:cubicBezTo>
-                  <a:cubicBezTo>
-                    <a:pt x="715406" y="1080410"/>
-                    <a:pt x="281211" y="1084892"/>
-                    <a:pt x="0" y="1085065"/>
-                  </a:cubicBezTo>
-                  <a:cubicBezTo>
-                    <a:pt x="-13849" y="960040"/>
-                    <a:pt x="-19899" y="725067"/>
-                    <a:pt x="0" y="553383"/>
-                  </a:cubicBezTo>
-                  <a:cubicBezTo>
-                    <a:pt x="19899" y="381699"/>
-                    <a:pt x="-3693" y="272116"/>
-                    <a:pt x="0" y="0"/>
-                  </a:cubicBezTo>
-                  <a:close/>
-                </a:path>
-                <a:path w="2127795" h="1085065" stroke="0" extrusionOk="0">
-                  <a:moveTo>
-                    <a:pt x="0" y="0"/>
-                  </a:moveTo>
-                  <a:cubicBezTo>
-                    <a:pt x="171248" y="-8495"/>
-                    <a:pt x="325453" y="21877"/>
-                    <a:pt x="510671" y="0"/>
-                  </a:cubicBezTo>
-                  <a:cubicBezTo>
-                    <a:pt x="695889" y="-21877"/>
-                    <a:pt x="802356" y="-16277"/>
-                    <a:pt x="978786" y="0"/>
-                  </a:cubicBezTo>
-                  <a:cubicBezTo>
-                    <a:pt x="1155217" y="16277"/>
-                    <a:pt x="1321550" y="15209"/>
-                    <a:pt x="1553290" y="0"/>
-                  </a:cubicBezTo>
-                  <a:cubicBezTo>
-                    <a:pt x="1785030" y="-15209"/>
-                    <a:pt x="1999571" y="-24705"/>
-                    <a:pt x="2127795" y="0"/>
-                  </a:cubicBezTo>
-                  <a:cubicBezTo>
-                    <a:pt x="2106315" y="169500"/>
-                    <a:pt x="2151273" y="285308"/>
-                    <a:pt x="2127795" y="531682"/>
-                  </a:cubicBezTo>
-                  <a:cubicBezTo>
-                    <a:pt x="2104317" y="778056"/>
-                    <a:pt x="2118403" y="967639"/>
-                    <a:pt x="2127795" y="1085065"/>
-                  </a:cubicBezTo>
-                  <a:cubicBezTo>
-                    <a:pt x="1970448" y="1066755"/>
-                    <a:pt x="1767058" y="1074801"/>
-                    <a:pt x="1595846" y="1085065"/>
-                  </a:cubicBezTo>
-                  <a:cubicBezTo>
-                    <a:pt x="1424634" y="1095329"/>
-                    <a:pt x="1144488" y="1080688"/>
-                    <a:pt x="1021342" y="1085065"/>
-                  </a:cubicBezTo>
-                  <a:cubicBezTo>
-                    <a:pt x="898196" y="1089442"/>
-                    <a:pt x="704334" y="1073542"/>
-                    <a:pt x="553227" y="1085065"/>
-                  </a:cubicBezTo>
-                  <a:cubicBezTo>
-                    <a:pt x="402121" y="1096588"/>
-                    <a:pt x="151220" y="1095466"/>
-                    <a:pt x="0" y="1085065"/>
-                  </a:cubicBezTo>
-                  <a:cubicBezTo>
-                    <a:pt x="21856" y="935562"/>
-                    <a:pt x="-26363" y="762075"/>
-                    <a:pt x="0" y="542533"/>
-                  </a:cubicBezTo>
-                  <a:cubicBezTo>
-                    <a:pt x="26363" y="322991"/>
-                    <a:pt x="24427" y="211558"/>
-                    <a:pt x="0" y="0"/>
-                  </a:cubicBezTo>
-                  <a:close/>
-                </a:path>
-              </a:pathLst>
-            </a:custGeom>
-            <a:solidFill>
-              <a:schemeClr val="accent4">
-                <a:lumMod val="60000"/>
-                <a:lumOff val="40000"/>
-              </a:schemeClr>
-            </a:solidFill>
-            <a:ln w="12700">
-              <a:solidFill>
-                <a:schemeClr val="tx1"/>
-              </a:solidFill>
-              <a:extLst>
-                <a:ext uri="{C807C97D-BFC1-408E-A445-0C87EB9F89A2}">
-                  <ask:lineSketchStyleProps xmlns:ask="http://schemas.microsoft.com/office/drawing/2018/sketchyshapes" sd="1219033472">
-                    <a:prstGeom prst="rect">
-                      <a:avLst/>
-                    </a:prstGeom>
-                    <ask:type>
-                      <ask:lineSketchFreehand/>
-                    </ask:type>
-                  </ask:lineSketchStyleProps>
-                </a:ext>
-              </a:extLst>
-            </a:ln>
-            <a:effectLst/>
-          </p:spPr>
-          <p:style>
-            <a:lnRef idx="1">
-              <a:schemeClr val="accent4"/>
-            </a:lnRef>
-            <a:fillRef idx="2">
-              <a:schemeClr val="accent4"/>
-            </a:fillRef>
-            <a:effectRef idx="1">
-              <a:schemeClr val="accent4"/>
-            </a:effectRef>
-            <a:fontRef idx="minor">
-              <a:schemeClr val="dk1"/>
-            </a:fontRef>
-          </p:style>
-          <p:txBody>
-            <a:bodyPr rtlCol="0" anchor="ctr"/>
-            <a:lstStyle/>
-            <a:p>
-              <a:pPr algn="ctr"/>
-              <a:r>
-                <a:rPr lang="en-US" sz="1600" dirty="0"/>
-                <a:t>Let’s see what happens if the user inputs “C”</a:t>
               </a:r>
             </a:p>
           </p:txBody>
@@ -5863,20 +5592,6 @@
 <file path=ppt/slides/slide10.xml><?xml version="1.0" encoding="utf-8"?>
 <p:sld xmlns:a="http://schemas.openxmlformats.org/drawingml/2006/main" xmlns:r="http://schemas.openxmlformats.org/officeDocument/2006/relationships" xmlns:p="http://schemas.openxmlformats.org/presentationml/2006/main">
   <p:cSld>
-    <p:bg>
-      <p:bgPr>
-        <a:blipFill dpi="0" rotWithShape="1">
-          <a:blip r:embed="rId2">
-            <a:lum/>
-          </a:blip>
-          <a:srcRect/>
-          <a:stretch>
-            <a:fillRect/>
-          </a:stretch>
-        </a:blipFill>
-        <a:effectLst/>
-      </p:bgPr>
-    </p:bg>
     <p:spTree>
       <p:nvGrpSpPr>
         <p:cNvPr id="1" name=""/>
@@ -5926,7 +5641,7 @@
           <p:spPr>
             <a:xfrm>
               <a:off x="2275695" y="-2609268"/>
-              <a:ext cx="5046276" cy="2800767"/>
+              <a:ext cx="5046276" cy="2554545"/>
             </a:xfrm>
             <a:prstGeom prst="rect">
               <a:avLst/>
@@ -5991,7 +5706,7 @@
               </a:pPr>
               <a:r>
                 <a:rPr lang="en-AU" sz="1600" dirty="0"/>
-                <a:t>  case "C#":</a:t>
+                <a:t>    case "C#":</a:t>
               </a:r>
             </a:p>
             <a:p>
@@ -6007,7 +5722,7 @@
                     </a:schemeClr>
                   </a:solidFill>
                 </a:rPr>
-                <a:t>    WriteLine("Good choice, C# is a fine language.");</a:t>
+                <a:t>        WriteLine("Good choice, C# is a fine language.");</a:t>
               </a:r>
             </a:p>
             <a:p>
@@ -6023,7 +5738,7 @@
                     </a:schemeClr>
                   </a:solidFill>
                 </a:rPr>
-                <a:t>    break;</a:t>
+                <a:t>        break;</a:t>
               </a:r>
             </a:p>
             <a:p>
@@ -6033,7 +5748,7 @@
               </a:pPr>
               <a:r>
                 <a:rPr lang="en-AU" sz="1600" dirty="0"/>
-                <a:t>  case "C":</a:t>
+                <a:t>    case "C":</a:t>
               </a:r>
             </a:p>
             <a:p>
@@ -6043,7 +5758,7 @@
               </a:pPr>
               <a:r>
                 <a:rPr lang="en-AU" sz="1600" dirty="0"/>
-                <a:t>  case "C++":</a:t>
+                <a:t>    case "C++":</a:t>
               </a:r>
             </a:p>
             <a:p>
@@ -6059,7 +5774,7 @@
                     </a:schemeClr>
                   </a:solidFill>
                 </a:rPr>
-                <a:t>    WriteLine("These are great low level languages - we will be using these soon!");</a:t>
+                <a:t>        WriteLine("These are great languages.");</a:t>
               </a:r>
             </a:p>
             <a:p>
@@ -6075,7 +5790,7 @@
                     </a:schemeClr>
                   </a:solidFill>
                 </a:rPr>
-                <a:t>    break;</a:t>
+                <a:t>        break;</a:t>
               </a:r>
             </a:p>
             <a:p>
@@ -6091,7 +5806,7 @@
                     </a:schemeClr>
                   </a:solidFill>
                 </a:rPr>
-                <a:t>  default:</a:t>
+                <a:t>    default:</a:t>
               </a:r>
             </a:p>
           </p:txBody>
@@ -6131,7 +5846,7 @@
               <p:nvPr/>
             </p:nvPicPr>
             <p:blipFill>
-              <a:blip r:embed="rId3">
+              <a:blip r:embed="rId2">
                 <a:alphaModFix amt="30000"/>
               </a:blip>
               <a:stretch>
@@ -8230,7 +7945,7 @@
             <p:nvPr/>
           </p:nvPicPr>
           <p:blipFill>
-            <a:blip r:embed="rId4">
+            <a:blip r:embed="rId3">
               <a:alphaModFix amt="30000"/>
             </a:blip>
             <a:stretch>
@@ -8643,20 +8358,6 @@
 <file path=ppt/slides/slide11.xml><?xml version="1.0" encoding="utf-8"?>
 <p:sld xmlns:a="http://schemas.openxmlformats.org/drawingml/2006/main" xmlns:r="http://schemas.openxmlformats.org/officeDocument/2006/relationships" xmlns:p="http://schemas.openxmlformats.org/presentationml/2006/main">
   <p:cSld>
-    <p:bg>
-      <p:bgPr>
-        <a:blipFill dpi="0" rotWithShape="1">
-          <a:blip r:embed="rId2">
-            <a:lum/>
-          </a:blip>
-          <a:srcRect/>
-          <a:stretch>
-            <a:fillRect/>
-          </a:stretch>
-        </a:blipFill>
-        <a:effectLst/>
-      </p:bgPr>
-    </p:bg>
     <p:spTree>
       <p:nvGrpSpPr>
         <p:cNvPr id="1" name=""/>
@@ -8686,7 +8387,7 @@
         <p:spPr>
           <a:xfrm>
             <a:off x="2273467" y="583701"/>
-            <a:ext cx="5046276" cy="2554545"/>
+            <a:ext cx="5046276" cy="2308324"/>
           </a:xfrm>
           <a:prstGeom prst="rect">
             <a:avLst/>
@@ -8711,7 +8412,7 @@
                   </a:schemeClr>
                 </a:solidFill>
               </a:rPr>
-              <a:t>  case "C":</a:t>
+              <a:t>    case "C":</a:t>
             </a:r>
           </a:p>
           <a:p>
@@ -8727,7 +8428,7 @@
                   </a:schemeClr>
                 </a:solidFill>
               </a:rPr>
-              <a:t>  case "C++":</a:t>
+              <a:t>    case "C++":</a:t>
             </a:r>
           </a:p>
           <a:p>
@@ -8743,7 +8444,7 @@
                   </a:schemeClr>
                 </a:solidFill>
               </a:rPr>
-              <a:t>    WriteLine("These are great low level languages - we will be using these soon!");</a:t>
+              <a:t>        WriteLine("These are great low level languages.");</a:t>
             </a:r>
           </a:p>
           <a:p>
@@ -8759,7 +8460,7 @@
                   </a:schemeClr>
                 </a:solidFill>
               </a:rPr>
-              <a:t>    break;</a:t>
+              <a:t>        break;</a:t>
             </a:r>
           </a:p>
           <a:p>
@@ -8769,7 +8470,7 @@
             </a:pPr>
             <a:r>
               <a:rPr lang="en-AU" sz="1600" dirty="0"/>
-              <a:t>  default:</a:t>
+              <a:t>    default:</a:t>
             </a:r>
           </a:p>
           <a:p>
@@ -8779,7 +8480,7 @@
             </a:pPr>
             <a:r>
               <a:rPr lang="en-AU" sz="1600" dirty="0"/>
-              <a:t>    WriteLine("Well... good luck with that!");</a:t>
+              <a:t>        WriteLine("Well... good luck with that!");</a:t>
             </a:r>
           </a:p>
           <a:p>
@@ -8843,7 +8544,7 @@
             <p:nvPr/>
           </p:nvPicPr>
           <p:blipFill>
-            <a:blip r:embed="rId3">
+            <a:blip r:embed="rId2">
               <a:alphaModFix amt="30000"/>
             </a:blip>
             <a:stretch>
@@ -10812,7 +10513,7 @@
           <p:nvPr/>
         </p:nvPicPr>
         <p:blipFill>
-          <a:blip r:embed="rId4">
+          <a:blip r:embed="rId3">
             <a:alphaModFix amt="30000"/>
           </a:blip>
           <a:stretch>
@@ -11103,7 +10804,7 @@
                   </a:schemeClr>
                 </a:solidFill>
               </a:rPr>
-              <a:t>These are great low level languages…</a:t>
+              <a:t>These are great low level languages.</a:t>
             </a:r>
             <a:endParaRPr lang="en-US" dirty="0">
               <a:solidFill>
@@ -11237,20 +10938,6 @@
 <file path=ppt/slides/slide2.xml><?xml version="1.0" encoding="utf-8"?>
 <p:sld xmlns:a="http://schemas.openxmlformats.org/drawingml/2006/main" xmlns:r="http://schemas.openxmlformats.org/officeDocument/2006/relationships" xmlns:p="http://schemas.openxmlformats.org/presentationml/2006/main">
   <p:cSld>
-    <p:bg>
-      <p:bgPr>
-        <a:blipFill dpi="0" rotWithShape="1">
-          <a:blip r:embed="rId2">
-            <a:lum/>
-          </a:blip>
-          <a:srcRect/>
-          <a:stretch>
-            <a:fillRect/>
-          </a:stretch>
-        </a:blipFill>
-        <a:effectLst/>
-      </p:bgPr>
-    </p:bg>
     <p:spTree>
       <p:nvGrpSpPr>
         <p:cNvPr id="1" name=""/>
@@ -11331,7 +11018,7 @@
                   </a:schemeClr>
                 </a:solidFill>
               </a:rPr>
-              <a:t>  case "C#":</a:t>
+              <a:t>    case "C#":</a:t>
             </a:r>
           </a:p>
           <a:p>
@@ -11347,7 +11034,7 @@
                   </a:schemeClr>
                 </a:solidFill>
               </a:rPr>
-              <a:t>    WriteLine("Good choice, C# is a fine language.");</a:t>
+              <a:t>        WriteLine("Good choice, C# is a fine language.");</a:t>
             </a:r>
           </a:p>
           <a:p>
@@ -11363,7 +11050,7 @@
                   </a:schemeClr>
                 </a:solidFill>
               </a:rPr>
-              <a:t>    break;</a:t>
+              <a:t>        break;</a:t>
             </a:r>
           </a:p>
           <a:p>
@@ -11379,7 +11066,7 @@
                   </a:schemeClr>
                 </a:solidFill>
               </a:rPr>
-              <a:t>  case "C":</a:t>
+              <a:t>    case "C":</a:t>
             </a:r>
           </a:p>
           <a:p>
@@ -11395,7 +11082,7 @@
                   </a:schemeClr>
                 </a:solidFill>
               </a:rPr>
-              <a:t>  case "C++":</a:t>
+              <a:t>    case "C++":</a:t>
             </a:r>
           </a:p>
           <a:p>
@@ -11411,7 +11098,7 @@
                   </a:schemeClr>
                 </a:solidFill>
               </a:rPr>
-              <a:t>    WriteLine("These are great low level languages…");</a:t>
+              <a:t>        WriteLine("These are great languages.");</a:t>
             </a:r>
           </a:p>
           <a:p>
@@ -11427,7 +11114,7 @@
                   </a:schemeClr>
                 </a:solidFill>
               </a:rPr>
-              <a:t>    break;</a:t>
+              <a:t>        break;</a:t>
             </a:r>
           </a:p>
         </p:txBody>
@@ -11467,7 +11154,7 @@
             <p:nvPr/>
           </p:nvPicPr>
           <p:blipFill>
-            <a:blip r:embed="rId3">
+            <a:blip r:embed="rId2">
               <a:alphaModFix amt="30000"/>
             </a:blip>
             <a:stretch>
@@ -13510,7 +13197,7 @@
           <p:nvPr/>
         </p:nvPicPr>
         <p:blipFill>
-          <a:blip r:embed="rId4">
+          <a:blip r:embed="rId3">
             <a:alphaModFix amt="30000"/>
           </a:blip>
           <a:stretch>
@@ -13781,20 +13468,6 @@
 <file path=ppt/slides/slide3.xml><?xml version="1.0" encoding="utf-8"?>
 <p:sld xmlns:a="http://schemas.openxmlformats.org/drawingml/2006/main" xmlns:r="http://schemas.openxmlformats.org/officeDocument/2006/relationships" xmlns:p="http://schemas.openxmlformats.org/presentationml/2006/main">
   <p:cSld>
-    <p:bg>
-      <p:bgPr>
-        <a:blipFill dpi="0" rotWithShape="1">
-          <a:blip r:embed="rId2">
-            <a:lum/>
-          </a:blip>
-          <a:srcRect/>
-          <a:stretch>
-            <a:fillRect/>
-          </a:stretch>
-        </a:blipFill>
-        <a:effectLst/>
-      </p:bgPr>
-    </p:bg>
     <p:spTree>
       <p:nvGrpSpPr>
         <p:cNvPr id="1" name=""/>
@@ -13889,7 +13562,7 @@
             </a:pPr>
             <a:r>
               <a:rPr lang="en-AU" sz="1600" dirty="0"/>
-              <a:t>  case "C#":</a:t>
+              <a:t>    case "C#":</a:t>
             </a:r>
           </a:p>
           <a:p>
@@ -13905,7 +13578,7 @@
                   </a:schemeClr>
                 </a:solidFill>
               </a:rPr>
-              <a:t>    WriteLine("Good choice, C# is a fine language.");</a:t>
+              <a:t>        WriteLine("Good choice, C# is a fine language.");</a:t>
             </a:r>
           </a:p>
           <a:p>
@@ -13921,7 +13594,7 @@
                   </a:schemeClr>
                 </a:solidFill>
               </a:rPr>
-              <a:t>    break;</a:t>
+              <a:t>        break;</a:t>
             </a:r>
           </a:p>
           <a:p>
@@ -13937,7 +13610,7 @@
                   </a:schemeClr>
                 </a:solidFill>
               </a:rPr>
-              <a:t>  case "C":</a:t>
+              <a:t>    case "C":</a:t>
             </a:r>
           </a:p>
           <a:p>
@@ -13953,7 +13626,7 @@
                   </a:schemeClr>
                 </a:solidFill>
               </a:rPr>
-              <a:t>  case "C++":</a:t>
+              <a:t>    case "C++":</a:t>
             </a:r>
           </a:p>
           <a:p>
@@ -13969,7 +13642,7 @@
                   </a:schemeClr>
                 </a:solidFill>
               </a:rPr>
-              <a:t>    WriteLine("These are great low level languages…");</a:t>
+              <a:t>        WriteLine("These are great languages.");</a:t>
             </a:r>
           </a:p>
           <a:p>
@@ -13985,7 +13658,7 @@
                   </a:schemeClr>
                 </a:solidFill>
               </a:rPr>
-              <a:t>    break;</a:t>
+              <a:t>        break;</a:t>
             </a:r>
           </a:p>
         </p:txBody>
@@ -14025,7 +13698,7 @@
             <p:nvPr/>
           </p:nvPicPr>
           <p:blipFill>
-            <a:blip r:embed="rId3">
+            <a:blip r:embed="rId2">
               <a:alphaModFix amt="30000"/>
             </a:blip>
             <a:stretch>
@@ -16068,7 +15741,7 @@
           <p:nvPr/>
         </p:nvPicPr>
         <p:blipFill>
-          <a:blip r:embed="rId4">
+          <a:blip r:embed="rId3">
             <a:alphaModFix amt="30000"/>
           </a:blip>
           <a:stretch>
@@ -16386,20 +16059,6 @@
 <file path=ppt/slides/slide4.xml><?xml version="1.0" encoding="utf-8"?>
 <p:sld xmlns:a="http://schemas.openxmlformats.org/drawingml/2006/main" xmlns:r="http://schemas.openxmlformats.org/officeDocument/2006/relationships" xmlns:p="http://schemas.openxmlformats.org/presentationml/2006/main">
   <p:cSld>
-    <p:bg>
-      <p:bgPr>
-        <a:blipFill dpi="0" rotWithShape="1">
-          <a:blip r:embed="rId2">
-            <a:lum/>
-          </a:blip>
-          <a:srcRect/>
-          <a:stretch>
-            <a:fillRect/>
-          </a:stretch>
-        </a:blipFill>
-        <a:effectLst/>
-      </p:bgPr>
-    </p:bg>
     <p:spTree>
       <p:nvGrpSpPr>
         <p:cNvPr id="1" name=""/>
@@ -16500,7 +16159,7 @@
                   </a:schemeClr>
                 </a:solidFill>
               </a:rPr>
-              <a:t>  case "C#":</a:t>
+              <a:t>    case "C#":</a:t>
             </a:r>
           </a:p>
           <a:p>
@@ -16516,7 +16175,7 @@
                   </a:schemeClr>
                 </a:solidFill>
               </a:rPr>
-              <a:t>    WriteLine("Good choice, C# is a fine language.");</a:t>
+              <a:t>        WriteLine("Good choice, C# is a fine language.");</a:t>
             </a:r>
           </a:p>
           <a:p>
@@ -16532,7 +16191,7 @@
                   </a:schemeClr>
                 </a:solidFill>
               </a:rPr>
-              <a:t>    break;</a:t>
+              <a:t>        break;</a:t>
             </a:r>
           </a:p>
           <a:p>
@@ -16542,7 +16201,7 @@
             </a:pPr>
             <a:r>
               <a:rPr lang="en-AU" sz="1600" dirty="0"/>
-              <a:t>  case "C":</a:t>
+              <a:t>    case "C":</a:t>
             </a:r>
           </a:p>
           <a:p>
@@ -16558,7 +16217,7 @@
                   </a:schemeClr>
                 </a:solidFill>
               </a:rPr>
-              <a:t>  case "C++":</a:t>
+              <a:t>    case "C++":</a:t>
             </a:r>
           </a:p>
           <a:p>
@@ -16574,7 +16233,7 @@
                   </a:schemeClr>
                 </a:solidFill>
               </a:rPr>
-              <a:t>    WriteLine("These are great low level languages…");</a:t>
+              <a:t>        WriteLine("These are great languages.");</a:t>
             </a:r>
           </a:p>
           <a:p>
@@ -16590,7 +16249,7 @@
                   </a:schemeClr>
                 </a:solidFill>
               </a:rPr>
-              <a:t>    break;</a:t>
+              <a:t>        break;</a:t>
             </a:r>
           </a:p>
         </p:txBody>
@@ -16630,7 +16289,7 @@
             <p:nvPr/>
           </p:nvPicPr>
           <p:blipFill>
-            <a:blip r:embed="rId3">
+            <a:blip r:embed="rId2">
               <a:alphaModFix amt="30000"/>
             </a:blip>
             <a:stretch>
@@ -18673,7 +18332,7 @@
           <p:nvPr/>
         </p:nvPicPr>
         <p:blipFill>
-          <a:blip r:embed="rId4">
+          <a:blip r:embed="rId3">
             <a:alphaModFix amt="30000"/>
           </a:blip>
           <a:stretch>
@@ -18991,20 +18650,6 @@
 <file path=ppt/slides/slide5.xml><?xml version="1.0" encoding="utf-8"?>
 <p:sld xmlns:a="http://schemas.openxmlformats.org/drawingml/2006/main" xmlns:r="http://schemas.openxmlformats.org/officeDocument/2006/relationships" xmlns:p="http://schemas.openxmlformats.org/presentationml/2006/main">
   <p:cSld>
-    <p:bg>
-      <p:bgPr>
-        <a:blipFill dpi="0" rotWithShape="1">
-          <a:blip r:embed="rId2">
-            <a:lum/>
-          </a:blip>
-          <a:srcRect/>
-          <a:stretch>
-            <a:fillRect/>
-          </a:stretch>
-        </a:blipFill>
-        <a:effectLst/>
-      </p:bgPr>
-    </p:bg>
     <p:spTree>
       <p:nvGrpSpPr>
         <p:cNvPr id="1" name=""/>
@@ -19059,7 +18704,7 @@
                   </a:schemeClr>
                 </a:solidFill>
               </a:rPr>
-              <a:t>  case "C":</a:t>
+              <a:t>    case "C":</a:t>
             </a:r>
           </a:p>
           <a:p>
@@ -19069,7 +18714,7 @@
             </a:pPr>
             <a:r>
               <a:rPr lang="en-AU" sz="1600" dirty="0"/>
-              <a:t>  case "C++":</a:t>
+              <a:t>    case "C++":</a:t>
             </a:r>
           </a:p>
           <a:p>
@@ -19085,7 +18730,7 @@
                   </a:schemeClr>
                 </a:solidFill>
               </a:rPr>
-              <a:t>    WriteLine("These are great low level languages…");</a:t>
+              <a:t>        WriteLine("These are great languages.");</a:t>
             </a:r>
           </a:p>
           <a:p>
@@ -19101,7 +18746,7 @@
                   </a:schemeClr>
                 </a:solidFill>
               </a:rPr>
-              <a:t>    break;</a:t>
+              <a:t>        break;</a:t>
             </a:r>
           </a:p>
           <a:p>
@@ -19117,7 +18762,7 @@
                   </a:schemeClr>
                 </a:solidFill>
               </a:rPr>
-              <a:t>  default:</a:t>
+              <a:t>    default:</a:t>
             </a:r>
           </a:p>
           <a:p>
@@ -19133,7 +18778,7 @@
                   </a:schemeClr>
                 </a:solidFill>
               </a:rPr>
-              <a:t>    WriteLine("Well... good luck with that!");</a:t>
+              <a:t>        WriteLine("Well... good luck with that!");</a:t>
             </a:r>
           </a:p>
           <a:p>
@@ -19221,7 +18866,7 @@
             <p:nvPr/>
           </p:nvPicPr>
           <p:blipFill>
-            <a:blip r:embed="rId3">
+            <a:blip r:embed="rId2">
               <a:alphaModFix amt="30000"/>
             </a:blip>
             <a:stretch>
@@ -21264,7 +20909,7 @@
           <p:nvPr/>
         </p:nvPicPr>
         <p:blipFill>
-          <a:blip r:embed="rId4">
+          <a:blip r:embed="rId3">
             <a:alphaModFix amt="30000"/>
           </a:blip>
           <a:stretch>
@@ -21535,20 +21180,6 @@
 <file path=ppt/slides/slide6.xml><?xml version="1.0" encoding="utf-8"?>
 <p:sld xmlns:a="http://schemas.openxmlformats.org/drawingml/2006/main" xmlns:r="http://schemas.openxmlformats.org/officeDocument/2006/relationships" xmlns:p="http://schemas.openxmlformats.org/presentationml/2006/main">
   <p:cSld>
-    <p:bg>
-      <p:bgPr>
-        <a:blipFill dpi="0" rotWithShape="1">
-          <a:blip r:embed="rId2">
-            <a:lum/>
-          </a:blip>
-          <a:srcRect/>
-          <a:stretch>
-            <a:fillRect/>
-          </a:stretch>
-        </a:blipFill>
-        <a:effectLst/>
-      </p:bgPr>
-    </p:bg>
     <p:spTree>
       <p:nvGrpSpPr>
         <p:cNvPr id="1" name=""/>
@@ -21603,7 +21234,7 @@
                   </a:schemeClr>
                 </a:solidFill>
               </a:rPr>
-              <a:t>  case "C":</a:t>
+              <a:t>    case "C":</a:t>
             </a:r>
           </a:p>
           <a:p>
@@ -21619,7 +21250,7 @@
                   </a:schemeClr>
                 </a:solidFill>
               </a:rPr>
-              <a:t>  case "C++":</a:t>
+              <a:t>    case "C++":</a:t>
             </a:r>
           </a:p>
           <a:p>
@@ -21629,7 +21260,7 @@
             </a:pPr>
             <a:r>
               <a:rPr lang="en-AU" sz="1600" dirty="0"/>
-              <a:t>    WriteLine("These are great low level languages…");</a:t>
+              <a:t>        WriteLine("These are great languages.");</a:t>
             </a:r>
           </a:p>
           <a:p>
@@ -21645,7 +21276,7 @@
                   </a:schemeClr>
                 </a:solidFill>
               </a:rPr>
-              <a:t>    break;</a:t>
+              <a:t>        break;</a:t>
             </a:r>
           </a:p>
           <a:p>
@@ -21661,7 +21292,7 @@
                   </a:schemeClr>
                 </a:solidFill>
               </a:rPr>
-              <a:t>  default:</a:t>
+              <a:t>    default:</a:t>
             </a:r>
           </a:p>
           <a:p>
@@ -21677,7 +21308,7 @@
                   </a:schemeClr>
                 </a:solidFill>
               </a:rPr>
-              <a:t>    WriteLine("Well... good luck with that!");</a:t>
+              <a:t>        WriteLine("Well... good luck with that!");</a:t>
             </a:r>
           </a:p>
           <a:p>
@@ -21765,7 +21396,7 @@
             <p:nvPr/>
           </p:nvPicPr>
           <p:blipFill>
-            <a:blip r:embed="rId3">
+            <a:blip r:embed="rId2">
               <a:alphaModFix amt="30000"/>
             </a:blip>
             <a:stretch>
@@ -23806,7 +23437,7 @@
           <p:nvPr/>
         </p:nvPicPr>
         <p:blipFill>
-          <a:blip r:embed="rId4">
+          <a:blip r:embed="rId3">
             <a:alphaModFix amt="30000"/>
           </a:blip>
           <a:stretch>
@@ -24091,7 +23722,11 @@
           <a:p>
             <a:r>
               <a:rPr lang="en-AU" sz="1800" dirty="0"/>
-              <a:t>These are great low level languages…</a:t>
+              <a:t>These are great languages</a:t>
+            </a:r>
+            <a:r>
+              <a:rPr lang="en-AU" dirty="0"/>
+              <a:t>.</a:t>
             </a:r>
             <a:endParaRPr lang="en-US" dirty="0">
               <a:solidFill>
@@ -24119,20 +23754,6 @@
 <file path=ppt/slides/slide7.xml><?xml version="1.0" encoding="utf-8"?>
 <p:sld xmlns:a="http://schemas.openxmlformats.org/drawingml/2006/main" xmlns:r="http://schemas.openxmlformats.org/officeDocument/2006/relationships" xmlns:p="http://schemas.openxmlformats.org/presentationml/2006/main">
   <p:cSld>
-    <p:bg>
-      <p:bgPr>
-        <a:blipFill dpi="0" rotWithShape="1">
-          <a:blip r:embed="rId2">
-            <a:lum/>
-          </a:blip>
-          <a:srcRect/>
-          <a:stretch>
-            <a:fillRect/>
-          </a:stretch>
-        </a:blipFill>
-        <a:effectLst/>
-      </p:bgPr>
-    </p:bg>
     <p:spTree>
       <p:nvGrpSpPr>
         <p:cNvPr id="1" name=""/>
@@ -24187,7 +23808,7 @@
                   </a:schemeClr>
                 </a:solidFill>
               </a:rPr>
-              <a:t>  case "C":</a:t>
+              <a:t>    case "C":</a:t>
             </a:r>
           </a:p>
           <a:p>
@@ -24203,7 +23824,7 @@
                   </a:schemeClr>
                 </a:solidFill>
               </a:rPr>
-              <a:t>  case "C++":</a:t>
+              <a:t>    case "C++":</a:t>
             </a:r>
           </a:p>
           <a:p>
@@ -24219,7 +23840,7 @@
                   </a:schemeClr>
                 </a:solidFill>
               </a:rPr>
-              <a:t>    WriteLine("These are great low level languages…");</a:t>
+              <a:t>        WriteLine("These are great languages.");</a:t>
             </a:r>
           </a:p>
           <a:p>
@@ -24229,7 +23850,7 @@
             </a:pPr>
             <a:r>
               <a:rPr lang="en-AU" sz="1600" dirty="0"/>
-              <a:t>    break;</a:t>
+              <a:t>        break;</a:t>
             </a:r>
           </a:p>
           <a:p>
@@ -24245,7 +23866,7 @@
                   </a:schemeClr>
                 </a:solidFill>
               </a:rPr>
-              <a:t>  default:</a:t>
+              <a:t>    default:</a:t>
             </a:r>
           </a:p>
           <a:p>
@@ -24261,7 +23882,7 @@
                   </a:schemeClr>
                 </a:solidFill>
               </a:rPr>
-              <a:t>    WriteLine("Well... good luck with that!");</a:t>
+              <a:t>        WriteLine("Well... good luck with that!");</a:t>
             </a:r>
           </a:p>
           <a:p>
@@ -24349,7 +23970,7 @@
             <p:nvPr/>
           </p:nvPicPr>
           <p:blipFill>
-            <a:blip r:embed="rId3">
+            <a:blip r:embed="rId2">
               <a:alphaModFix amt="30000"/>
             </a:blip>
             <a:stretch>
@@ -26392,7 +26013,7 @@
           <p:nvPr/>
         </p:nvPicPr>
         <p:blipFill>
-          <a:blip r:embed="rId4">
+          <a:blip r:embed="rId3">
             <a:alphaModFix amt="30000"/>
           </a:blip>
           <a:stretch>
@@ -26683,7 +26304,7 @@
                   </a:schemeClr>
                 </a:solidFill>
               </a:rPr>
-              <a:t>These are great low level languages…</a:t>
+              <a:t>These are great languages.</a:t>
             </a:r>
             <a:endParaRPr lang="en-US" dirty="0">
               <a:solidFill>
@@ -26711,20 +26332,6 @@
 <file path=ppt/slides/slide8.xml><?xml version="1.0" encoding="utf-8"?>
 <p:sld xmlns:a="http://schemas.openxmlformats.org/drawingml/2006/main" xmlns:r="http://schemas.openxmlformats.org/officeDocument/2006/relationships" xmlns:p="http://schemas.openxmlformats.org/presentationml/2006/main">
   <p:cSld>
-    <p:bg>
-      <p:bgPr>
-        <a:blipFill dpi="0" rotWithShape="1">
-          <a:blip r:embed="rId2">
-            <a:lum/>
-          </a:blip>
-          <a:srcRect/>
-          <a:stretch>
-            <a:fillRect/>
-          </a:stretch>
-        </a:blipFill>
-        <a:effectLst/>
-      </p:bgPr>
-    </p:bg>
     <p:spTree>
       <p:nvGrpSpPr>
         <p:cNvPr id="1" name=""/>
@@ -26779,7 +26386,7 @@
                   </a:schemeClr>
                 </a:solidFill>
               </a:rPr>
-              <a:t>  case "C":</a:t>
+              <a:t>    case "C":</a:t>
             </a:r>
           </a:p>
           <a:p>
@@ -26795,7 +26402,7 @@
                   </a:schemeClr>
                 </a:solidFill>
               </a:rPr>
-              <a:t>  case "C++":</a:t>
+              <a:t>    case "C++":</a:t>
             </a:r>
           </a:p>
           <a:p>
@@ -26811,7 +26418,7 @@
                   </a:schemeClr>
                 </a:solidFill>
               </a:rPr>
-              <a:t>    WriteLine("These are great low level languages…");</a:t>
+              <a:t>        WriteLine("These are great languages.");</a:t>
             </a:r>
           </a:p>
           <a:p>
@@ -26827,7 +26434,7 @@
                   </a:schemeClr>
                 </a:solidFill>
               </a:rPr>
-              <a:t>    break;</a:t>
+              <a:t>        break;</a:t>
             </a:r>
           </a:p>
           <a:p>
@@ -26843,7 +26450,7 @@
                   </a:schemeClr>
                 </a:solidFill>
               </a:rPr>
-              <a:t>  default:</a:t>
+              <a:t>    default:</a:t>
             </a:r>
           </a:p>
           <a:p>
@@ -26859,7 +26466,7 @@
                   </a:schemeClr>
                 </a:solidFill>
               </a:rPr>
-              <a:t>    WriteLine("Well... good luck with that!");</a:t>
+              <a:t>        WriteLine("Well... good luck with that!");</a:t>
             </a:r>
           </a:p>
           <a:p>
@@ -26941,7 +26548,7 @@
             <p:nvPr/>
           </p:nvPicPr>
           <p:blipFill>
-            <a:blip r:embed="rId3">
+            <a:blip r:embed="rId2">
               <a:alphaModFix amt="30000"/>
             </a:blip>
             <a:stretch>
@@ -28939,7 +28546,7 @@
           <p:nvPr/>
         </p:nvPicPr>
         <p:blipFill>
-          <a:blip r:embed="rId4">
+          <a:blip r:embed="rId3">
             <a:alphaModFix amt="30000"/>
           </a:blip>
           <a:stretch>
@@ -29230,7 +28837,7 @@
                   </a:schemeClr>
                 </a:solidFill>
               </a:rPr>
-              <a:t>These are great low level languages…</a:t>
+              <a:t>These are great languages.</a:t>
             </a:r>
             <a:endParaRPr lang="en-US" dirty="0">
               <a:solidFill>
@@ -29293,20 +28900,6 @@
 <file path=ppt/slides/slide9.xml><?xml version="1.0" encoding="utf-8"?>
 <p:sld xmlns:a="http://schemas.openxmlformats.org/drawingml/2006/main" xmlns:r="http://schemas.openxmlformats.org/officeDocument/2006/relationships" xmlns:p="http://schemas.openxmlformats.org/presentationml/2006/main">
   <p:cSld>
-    <p:bg>
-      <p:bgPr>
-        <a:blipFill dpi="0" rotWithShape="1">
-          <a:blip r:embed="rId2">
-            <a:lum/>
-          </a:blip>
-          <a:srcRect/>
-          <a:stretch>
-            <a:fillRect/>
-          </a:stretch>
-        </a:blipFill>
-        <a:effectLst/>
-      </p:bgPr>
-    </p:bg>
     <p:spTree>
       <p:nvGrpSpPr>
         <p:cNvPr id="1" name=""/>
@@ -29566,7 +29159,7 @@
               <p:nvPr/>
             </p:nvPicPr>
             <p:blipFill>
-              <a:blip r:embed="rId3">
+              <a:blip r:embed="rId2">
                 <a:alphaModFix amt="30000"/>
               </a:blip>
               <a:stretch>
@@ -31657,7 +31250,7 @@
             <p:nvPr/>
           </p:nvPicPr>
           <p:blipFill>
-            <a:blip r:embed="rId4">
+            <a:blip r:embed="rId3">
               <a:alphaModFix amt="30000"/>
             </a:blip>
             <a:stretch>
@@ -31746,272 +31339,6 @@
               <a:r>
                 <a:rPr lang="en-US" dirty="0"/>
                 <a:t>Fortran</a:t>
-              </a:r>
-            </a:p>
-          </p:txBody>
-        </p:sp>
-        <p:sp>
-          <p:nvSpPr>
-            <p:cNvPr id="9" name="Rectangle 8">
-              <a:extLst>
-                <a:ext uri="{FF2B5EF4-FFF2-40B4-BE49-F238E27FC236}">
-                  <a16:creationId xmlns:a16="http://schemas.microsoft.com/office/drawing/2014/main" id="{5DC39B20-F863-7C67-FD78-60CFCC23A0E8}"/>
-                </a:ext>
-              </a:extLst>
-            </p:cNvPr>
-            <p:cNvSpPr/>
-            <p:nvPr/>
-          </p:nvSpPr>
-          <p:spPr>
-            <a:xfrm>
-              <a:off x="5034017" y="-2432404"/>
-              <a:ext cx="2127795" cy="1085065"/>
-            </a:xfrm>
-            <a:custGeom>
-              <a:avLst/>
-              <a:gdLst>
-                <a:gd name="connsiteX0" fmla="*/ 0 w 2127795"/>
-                <a:gd name="connsiteY0" fmla="*/ 0 h 1085065"/>
-                <a:gd name="connsiteX1" fmla="*/ 510671 w 2127795"/>
-                <a:gd name="connsiteY1" fmla="*/ 0 h 1085065"/>
-                <a:gd name="connsiteX2" fmla="*/ 1042620 w 2127795"/>
-                <a:gd name="connsiteY2" fmla="*/ 0 h 1085065"/>
-                <a:gd name="connsiteX3" fmla="*/ 1595846 w 2127795"/>
-                <a:gd name="connsiteY3" fmla="*/ 0 h 1085065"/>
-                <a:gd name="connsiteX4" fmla="*/ 2127795 w 2127795"/>
-                <a:gd name="connsiteY4" fmla="*/ 0 h 1085065"/>
-                <a:gd name="connsiteX5" fmla="*/ 2127795 w 2127795"/>
-                <a:gd name="connsiteY5" fmla="*/ 553383 h 1085065"/>
-                <a:gd name="connsiteX6" fmla="*/ 2127795 w 2127795"/>
-                <a:gd name="connsiteY6" fmla="*/ 1085065 h 1085065"/>
-                <a:gd name="connsiteX7" fmla="*/ 1553290 w 2127795"/>
-                <a:gd name="connsiteY7" fmla="*/ 1085065 h 1085065"/>
-                <a:gd name="connsiteX8" fmla="*/ 978786 w 2127795"/>
-                <a:gd name="connsiteY8" fmla="*/ 1085065 h 1085065"/>
-                <a:gd name="connsiteX9" fmla="*/ 0 w 2127795"/>
-                <a:gd name="connsiteY9" fmla="*/ 1085065 h 1085065"/>
-                <a:gd name="connsiteX10" fmla="*/ 0 w 2127795"/>
-                <a:gd name="connsiteY10" fmla="*/ 553383 h 1085065"/>
-                <a:gd name="connsiteX11" fmla="*/ 0 w 2127795"/>
-                <a:gd name="connsiteY11" fmla="*/ 0 h 1085065"/>
-              </a:gdLst>
-              <a:ahLst/>
-              <a:cxnLst>
-                <a:cxn ang="0">
-                  <a:pos x="connsiteX0" y="connsiteY0"/>
-                </a:cxn>
-                <a:cxn ang="0">
-                  <a:pos x="connsiteX1" y="connsiteY1"/>
-                </a:cxn>
-                <a:cxn ang="0">
-                  <a:pos x="connsiteX2" y="connsiteY2"/>
-                </a:cxn>
-                <a:cxn ang="0">
-                  <a:pos x="connsiteX3" y="connsiteY3"/>
-                </a:cxn>
-                <a:cxn ang="0">
-                  <a:pos x="connsiteX4" y="connsiteY4"/>
-                </a:cxn>
-                <a:cxn ang="0">
-                  <a:pos x="connsiteX5" y="connsiteY5"/>
-                </a:cxn>
-                <a:cxn ang="0">
-                  <a:pos x="connsiteX6" y="connsiteY6"/>
-                </a:cxn>
-                <a:cxn ang="0">
-                  <a:pos x="connsiteX7" y="connsiteY7"/>
-                </a:cxn>
-                <a:cxn ang="0">
-                  <a:pos x="connsiteX8" y="connsiteY8"/>
-                </a:cxn>
-                <a:cxn ang="0">
-                  <a:pos x="connsiteX9" y="connsiteY9"/>
-                </a:cxn>
-                <a:cxn ang="0">
-                  <a:pos x="connsiteX10" y="connsiteY10"/>
-                </a:cxn>
-                <a:cxn ang="0">
-                  <a:pos x="connsiteX11" y="connsiteY11"/>
-                </a:cxn>
-              </a:cxnLst>
-              <a:rect l="l" t="t" r="r" b="b"/>
-              <a:pathLst>
-                <a:path w="2127795" h="1085065" fill="none" extrusionOk="0">
-                  <a:moveTo>
-                    <a:pt x="0" y="0"/>
-                  </a:moveTo>
-                  <a:cubicBezTo>
-                    <a:pt x="119302" y="-23815"/>
-                    <a:pt x="321953" y="-4268"/>
-                    <a:pt x="510671" y="0"/>
-                  </a:cubicBezTo>
-                  <a:cubicBezTo>
-                    <a:pt x="699389" y="4268"/>
-                    <a:pt x="838038" y="-4296"/>
-                    <a:pt x="1042620" y="0"/>
-                  </a:cubicBezTo>
-                  <a:cubicBezTo>
-                    <a:pt x="1247202" y="4296"/>
-                    <a:pt x="1418238" y="-20161"/>
-                    <a:pt x="1595846" y="0"/>
-                  </a:cubicBezTo>
-                  <a:cubicBezTo>
-                    <a:pt x="1773454" y="20161"/>
-                    <a:pt x="1930348" y="288"/>
-                    <a:pt x="2127795" y="0"/>
-                  </a:cubicBezTo>
-                  <a:cubicBezTo>
-                    <a:pt x="2127420" y="271704"/>
-                    <a:pt x="2137858" y="397892"/>
-                    <a:pt x="2127795" y="553383"/>
-                  </a:cubicBezTo>
-                  <a:cubicBezTo>
-                    <a:pt x="2117732" y="708874"/>
-                    <a:pt x="2106280" y="956975"/>
-                    <a:pt x="2127795" y="1085065"/>
-                  </a:cubicBezTo>
-                  <a:cubicBezTo>
-                    <a:pt x="1890946" y="1101697"/>
-                    <a:pt x="1709293" y="1081968"/>
-                    <a:pt x="1553290" y="1085065"/>
-                  </a:cubicBezTo>
-                  <a:cubicBezTo>
-                    <a:pt x="1397287" y="1088162"/>
-                    <a:pt x="1242166" y="1089720"/>
-                    <a:pt x="978786" y="1085065"/>
-                  </a:cubicBezTo>
-                  <a:cubicBezTo>
-                    <a:pt x="715406" y="1080410"/>
-                    <a:pt x="281211" y="1084892"/>
-                    <a:pt x="0" y="1085065"/>
-                  </a:cubicBezTo>
-                  <a:cubicBezTo>
-                    <a:pt x="-13849" y="960040"/>
-                    <a:pt x="-19899" y="725067"/>
-                    <a:pt x="0" y="553383"/>
-                  </a:cubicBezTo>
-                  <a:cubicBezTo>
-                    <a:pt x="19899" y="381699"/>
-                    <a:pt x="-3693" y="272116"/>
-                    <a:pt x="0" y="0"/>
-                  </a:cubicBezTo>
-                  <a:close/>
-                </a:path>
-                <a:path w="2127795" h="1085065" stroke="0" extrusionOk="0">
-                  <a:moveTo>
-                    <a:pt x="0" y="0"/>
-                  </a:moveTo>
-                  <a:cubicBezTo>
-                    <a:pt x="171248" y="-8495"/>
-                    <a:pt x="325453" y="21877"/>
-                    <a:pt x="510671" y="0"/>
-                  </a:cubicBezTo>
-                  <a:cubicBezTo>
-                    <a:pt x="695889" y="-21877"/>
-                    <a:pt x="802356" y="-16277"/>
-                    <a:pt x="978786" y="0"/>
-                  </a:cubicBezTo>
-                  <a:cubicBezTo>
-                    <a:pt x="1155217" y="16277"/>
-                    <a:pt x="1321550" y="15209"/>
-                    <a:pt x="1553290" y="0"/>
-                  </a:cubicBezTo>
-                  <a:cubicBezTo>
-                    <a:pt x="1785030" y="-15209"/>
-                    <a:pt x="1999571" y="-24705"/>
-                    <a:pt x="2127795" y="0"/>
-                  </a:cubicBezTo>
-                  <a:cubicBezTo>
-                    <a:pt x="2106315" y="169500"/>
-                    <a:pt x="2151273" y="285308"/>
-                    <a:pt x="2127795" y="531682"/>
-                  </a:cubicBezTo>
-                  <a:cubicBezTo>
-                    <a:pt x="2104317" y="778056"/>
-                    <a:pt x="2118403" y="967639"/>
-                    <a:pt x="2127795" y="1085065"/>
-                  </a:cubicBezTo>
-                  <a:cubicBezTo>
-                    <a:pt x="1970448" y="1066755"/>
-                    <a:pt x="1767058" y="1074801"/>
-                    <a:pt x="1595846" y="1085065"/>
-                  </a:cubicBezTo>
-                  <a:cubicBezTo>
-                    <a:pt x="1424634" y="1095329"/>
-                    <a:pt x="1144488" y="1080688"/>
-                    <a:pt x="1021342" y="1085065"/>
-                  </a:cubicBezTo>
-                  <a:cubicBezTo>
-                    <a:pt x="898196" y="1089442"/>
-                    <a:pt x="704334" y="1073542"/>
-                    <a:pt x="553227" y="1085065"/>
-                  </a:cubicBezTo>
-                  <a:cubicBezTo>
-                    <a:pt x="402121" y="1096588"/>
-                    <a:pt x="151220" y="1095466"/>
-                    <a:pt x="0" y="1085065"/>
-                  </a:cubicBezTo>
-                  <a:cubicBezTo>
-                    <a:pt x="21856" y="935562"/>
-                    <a:pt x="-26363" y="762075"/>
-                    <a:pt x="0" y="542533"/>
-                  </a:cubicBezTo>
-                  <a:cubicBezTo>
-                    <a:pt x="26363" y="322991"/>
-                    <a:pt x="24427" y="211558"/>
-                    <a:pt x="0" y="0"/>
-                  </a:cubicBezTo>
-                  <a:close/>
-                </a:path>
-              </a:pathLst>
-            </a:custGeom>
-            <a:solidFill>
-              <a:schemeClr val="accent4">
-                <a:lumMod val="60000"/>
-                <a:lumOff val="40000"/>
-              </a:schemeClr>
-            </a:solidFill>
-            <a:ln w="12700">
-              <a:solidFill>
-                <a:schemeClr val="tx1"/>
-              </a:solidFill>
-              <a:extLst>
-                <a:ext uri="{C807C97D-BFC1-408E-A445-0C87EB9F89A2}">
-                  <ask:lineSketchStyleProps xmlns:ask="http://schemas.microsoft.com/office/drawing/2018/sketchyshapes" sd="1219033472">
-                    <a:prstGeom prst="rect">
-                      <a:avLst/>
-                    </a:prstGeom>
-                    <ask:type>
-                      <ask:lineSketchFreehand/>
-                    </ask:type>
-                  </ask:lineSketchStyleProps>
-                </a:ext>
-              </a:extLst>
-            </a:ln>
-            <a:effectLst/>
-          </p:spPr>
-          <p:style>
-            <a:lnRef idx="1">
-              <a:schemeClr val="accent4"/>
-            </a:lnRef>
-            <a:fillRef idx="2">
-              <a:schemeClr val="accent4"/>
-            </a:fillRef>
-            <a:effectRef idx="1">
-              <a:schemeClr val="accent4"/>
-            </a:effectRef>
-            <a:fontRef idx="minor">
-              <a:schemeClr val="dk1"/>
-            </a:fontRef>
-          </p:style>
-          <p:txBody>
-            <a:bodyPr rtlCol="0" anchor="ctr"/>
-            <a:lstStyle/>
-            <a:p>
-              <a:pPr algn="ctr"/>
-              <a:r>
-                <a:rPr lang="en-US" sz="1600" dirty="0"/>
-                <a:t>Let’s see what happens if the user inputs “Fortran”</a:t>
               </a:r>
             </a:p>
           </p:txBody>

</xml_diff>